<commit_message>
Flower Agent testing update - Created the visualization notebook
</commit_message>
<xml_diff>
--- a/Extra files/Environment structure.pptx
+++ b/Extra files/Environment structure.pptx
@@ -198,7 +198,7 @@
           <a:p>
             <a:fld id="{044555AD-4AA1-FA42-8FD3-EB1FC2DBADED}" type="datetimeFigureOut">
               <a:rPr lang="en-US" smtClean="0"/>
-              <a:t>10/26/23</a:t>
+              <a:t>12/28/23</a:t>
             </a:fld>
             <a:endParaRPr lang="en-US"/>
           </a:p>
@@ -696,7 +696,7 @@
           <a:p>
             <a:fld id="{F0438D75-6BB9-074B-BA56-18BB868D5A9A}" type="datetimeFigureOut">
               <a:rPr lang="en-US" smtClean="0"/>
-              <a:t>10/26/23</a:t>
+              <a:t>12/28/23</a:t>
             </a:fld>
             <a:endParaRPr lang="en-US"/>
           </a:p>
@@ -894,7 +894,7 @@
           <a:p>
             <a:fld id="{F0438D75-6BB9-074B-BA56-18BB868D5A9A}" type="datetimeFigureOut">
               <a:rPr lang="en-US" smtClean="0"/>
-              <a:t>10/26/23</a:t>
+              <a:t>12/28/23</a:t>
             </a:fld>
             <a:endParaRPr lang="en-US"/>
           </a:p>
@@ -1102,7 +1102,7 @@
           <a:p>
             <a:fld id="{F0438D75-6BB9-074B-BA56-18BB868D5A9A}" type="datetimeFigureOut">
               <a:rPr lang="en-US" smtClean="0"/>
-              <a:t>10/26/23</a:t>
+              <a:t>12/28/23</a:t>
             </a:fld>
             <a:endParaRPr lang="en-US"/>
           </a:p>
@@ -1300,7 +1300,7 @@
           <a:p>
             <a:fld id="{F0438D75-6BB9-074B-BA56-18BB868D5A9A}" type="datetimeFigureOut">
               <a:rPr lang="en-US" smtClean="0"/>
-              <a:t>10/26/23</a:t>
+              <a:t>12/28/23</a:t>
             </a:fld>
             <a:endParaRPr lang="en-US"/>
           </a:p>
@@ -1575,7 +1575,7 @@
           <a:p>
             <a:fld id="{F0438D75-6BB9-074B-BA56-18BB868D5A9A}" type="datetimeFigureOut">
               <a:rPr lang="en-US" smtClean="0"/>
-              <a:t>10/26/23</a:t>
+              <a:t>12/28/23</a:t>
             </a:fld>
             <a:endParaRPr lang="en-US"/>
           </a:p>
@@ -1840,7 +1840,7 @@
           <a:p>
             <a:fld id="{F0438D75-6BB9-074B-BA56-18BB868D5A9A}" type="datetimeFigureOut">
               <a:rPr lang="en-US" smtClean="0"/>
-              <a:t>10/26/23</a:t>
+              <a:t>12/28/23</a:t>
             </a:fld>
             <a:endParaRPr lang="en-US"/>
           </a:p>
@@ -2252,7 +2252,7 @@
           <a:p>
             <a:fld id="{F0438D75-6BB9-074B-BA56-18BB868D5A9A}" type="datetimeFigureOut">
               <a:rPr lang="en-US" smtClean="0"/>
-              <a:t>10/26/23</a:t>
+              <a:t>12/28/23</a:t>
             </a:fld>
             <a:endParaRPr lang="en-US"/>
           </a:p>
@@ -2393,7 +2393,7 @@
           <a:p>
             <a:fld id="{F0438D75-6BB9-074B-BA56-18BB868D5A9A}" type="datetimeFigureOut">
               <a:rPr lang="en-US" smtClean="0"/>
-              <a:t>10/26/23</a:t>
+              <a:t>12/28/23</a:t>
             </a:fld>
             <a:endParaRPr lang="en-US"/>
           </a:p>
@@ -2506,7 +2506,7 @@
           <a:p>
             <a:fld id="{F0438D75-6BB9-074B-BA56-18BB868D5A9A}" type="datetimeFigureOut">
               <a:rPr lang="en-US" smtClean="0"/>
-              <a:t>10/26/23</a:t>
+              <a:t>12/28/23</a:t>
             </a:fld>
             <a:endParaRPr lang="en-US"/>
           </a:p>
@@ -2817,7 +2817,7 @@
           <a:p>
             <a:fld id="{F0438D75-6BB9-074B-BA56-18BB868D5A9A}" type="datetimeFigureOut">
               <a:rPr lang="en-US" smtClean="0"/>
-              <a:t>10/26/23</a:t>
+              <a:t>12/28/23</a:t>
             </a:fld>
             <a:endParaRPr lang="en-US"/>
           </a:p>
@@ -3105,7 +3105,7 @@
           <a:p>
             <a:fld id="{F0438D75-6BB9-074B-BA56-18BB868D5A9A}" type="datetimeFigureOut">
               <a:rPr lang="en-US" smtClean="0"/>
-              <a:t>10/26/23</a:t>
+              <a:t>12/28/23</a:t>
             </a:fld>
             <a:endParaRPr lang="en-US"/>
           </a:p>
@@ -3346,7 +3346,7 @@
           <a:p>
             <a:fld id="{F0438D75-6BB9-074B-BA56-18BB868D5A9A}" type="datetimeFigureOut">
               <a:rPr lang="en-US" smtClean="0"/>
-              <a:t>10/26/23</a:t>
+              <a:t>12/28/23</a:t>
             </a:fld>
             <a:endParaRPr lang="en-US"/>
           </a:p>
@@ -4325,7 +4325,7 @@
           </p:nvSpPr>
           <p:spPr>
             <a:xfrm>
-              <a:off x="6151204" y="1613853"/>
+              <a:off x="6182734" y="1613853"/>
               <a:ext cx="1234248" cy="442557"/>
             </a:xfrm>
             <a:prstGeom prst="ellipse">
@@ -4384,7 +4384,7 @@
           </p:nvSpPr>
           <p:spPr>
             <a:xfrm>
-              <a:off x="7503731" y="1574151"/>
+              <a:off x="7514241" y="1574151"/>
               <a:ext cx="1459626" cy="551701"/>
             </a:xfrm>
             <a:prstGeom prst="ellipse">
@@ -5113,8 +5113,8 @@
           </a:fontRef>
         </p:style>
       </p:cxnSp>
-      <mc:AlternateContent xmlns:mc="http://schemas.openxmlformats.org/markup-compatibility/2006" xmlns:a14="http://schemas.microsoft.com/office/drawing/2010/main">
-        <mc:Choice Requires="a14">
+      <mc:AlternateContent xmlns:mc="http://schemas.openxmlformats.org/markup-compatibility/2006">
+        <mc:Choice xmlns:a14="http://schemas.microsoft.com/office/drawing/2010/main" Requires="a14">
           <p:sp>
             <p:nvSpPr>
               <p:cNvPr id="197" name="TextBox 196">
@@ -5130,7 +5130,7 @@
             <p:spPr>
               <a:xfrm>
                 <a:off x="8849678" y="2412246"/>
-                <a:ext cx="286553" cy="276999"/>
+                <a:ext cx="261867" cy="276999"/>
               </a:xfrm>
               <a:prstGeom prst="rect">
                 <a:avLst/>
@@ -5163,7 +5163,7 @@
                             <a:rPr lang="en-US" b="0" i="1" smtClean="0">
                               <a:latin typeface="Cambria Math" panose="02040503050406030204" pitchFamily="18" charset="0"/>
                             </a:rPr>
-                            <m:t>𝐴</m:t>
+                            <m:t>𝑥</m:t>
                           </m:r>
                         </m:e>
                         <m:sub>
@@ -5183,7 +5183,7 @@
             </p:txBody>
           </p:sp>
         </mc:Choice>
-        <mc:Fallback xmlns="">
+        <mc:Fallback>
           <p:sp>
             <p:nvSpPr>
               <p:cNvPr id="197" name="TextBox 196">
@@ -5201,7 +5201,7 @@
             <p:spPr>
               <a:xfrm>
                 <a:off x="8849678" y="2412246"/>
-                <a:ext cx="286553" cy="276999"/>
+                <a:ext cx="261867" cy="276999"/>
               </a:xfrm>
               <a:prstGeom prst="rect">
                 <a:avLst/>
@@ -5209,7 +5209,7 @@
               <a:blipFill>
                 <a:blip r:embed="rId3"/>
                 <a:stretch>
-                  <a:fillRect l="-16667" r="-4167" b="-18182"/>
+                  <a:fillRect l="-9091" r="-4545" b="-18182"/>
                 </a:stretch>
               </a:blipFill>
             </p:spPr>
@@ -5458,8 +5458,8 @@
           </p:sp>
         </mc:Fallback>
       </mc:AlternateContent>
-      <mc:AlternateContent xmlns:mc="http://schemas.openxmlformats.org/markup-compatibility/2006" xmlns:a14="http://schemas.microsoft.com/office/drawing/2010/main">
-        <mc:Choice Requires="a14">
+      <mc:AlternateContent xmlns:mc="http://schemas.openxmlformats.org/markup-compatibility/2006">
+        <mc:Choice xmlns:a14="http://schemas.microsoft.com/office/drawing/2010/main" Requires="a14">
           <p:sp>
             <p:nvSpPr>
               <p:cNvPr id="200" name="TextBox 199">
@@ -5475,7 +5475,7 @@
             <p:spPr>
               <a:xfrm>
                 <a:off x="5567076" y="3809771"/>
-                <a:ext cx="222560" cy="215444"/>
+                <a:ext cx="203197" cy="215444"/>
               </a:xfrm>
               <a:prstGeom prst="rect">
                 <a:avLst/>
@@ -5508,7 +5508,7 @@
                             <a:rPr lang="en-US" sz="1400" b="0" i="1" smtClean="0">
                               <a:latin typeface="Cambria Math" panose="02040503050406030204" pitchFamily="18" charset="0"/>
                             </a:rPr>
-                            <m:t>𝐴</m:t>
+                            <m:t>𝑥</m:t>
                           </m:r>
                         </m:e>
                         <m:sub>
@@ -5528,7 +5528,7 @@
             </p:txBody>
           </p:sp>
         </mc:Choice>
-        <mc:Fallback xmlns="">
+        <mc:Fallback>
           <p:sp>
             <p:nvSpPr>
               <p:cNvPr id="200" name="TextBox 199">
@@ -5546,7 +5546,7 @@
             <p:spPr>
               <a:xfrm>
                 <a:off x="5567076" y="3809771"/>
-                <a:ext cx="222560" cy="215444"/>
+                <a:ext cx="203197" cy="215444"/>
               </a:xfrm>
               <a:prstGeom prst="rect">
                 <a:avLst/>
@@ -5554,7 +5554,7 @@
               <a:blipFill>
                 <a:blip r:embed="rId6"/>
                 <a:stretch>
-                  <a:fillRect l="-15789" b="-17647"/>
+                  <a:fillRect l="-11765" r="-5882" b="-17647"/>
                 </a:stretch>
               </a:blipFill>
             </p:spPr>

</xml_diff>

<commit_message>
Latest changes and results
</commit_message>
<xml_diff>
--- a/Extra files/Environment structure.pptx
+++ b/Extra files/Environment structure.pptx
@@ -5,11 +5,12 @@
     <p:sldMasterId id="2147483648" r:id="rId1"/>
   </p:sldMasterIdLst>
   <p:notesMasterIdLst>
-    <p:notesMasterId r:id="rId4"/>
+    <p:notesMasterId r:id="rId5"/>
   </p:notesMasterIdLst>
   <p:sldIdLst>
     <p:sldId id="257" r:id="rId2"/>
-    <p:sldId id="256" r:id="rId3"/>
+    <p:sldId id="258" r:id="rId3"/>
+    <p:sldId id="256" r:id="rId4"/>
   </p:sldIdLst>
   <p:sldSz cx="12192000" cy="6858000"/>
   <p:notesSz cx="6858000" cy="9144000"/>
@@ -198,7 +199,7 @@
           <a:p>
             <a:fld id="{044555AD-4AA1-FA42-8FD3-EB1FC2DBADED}" type="datetimeFigureOut">
               <a:rPr lang="en-US" smtClean="0"/>
-              <a:t>12/28/23</a:t>
+              <a:t>1/10/24</a:t>
             </a:fld>
             <a:endParaRPr lang="en-US"/>
           </a:p>
@@ -549,6 +550,90 @@
 </p:notes>
 </file>
 
+<file path=ppt/notesSlides/notesSlide2.xml><?xml version="1.0" encoding="utf-8"?>
+<p:notes xmlns:a="http://schemas.openxmlformats.org/drawingml/2006/main" xmlns:r="http://schemas.openxmlformats.org/officeDocument/2006/relationships" xmlns:p="http://schemas.openxmlformats.org/presentationml/2006/main">
+  <p:cSld>
+    <p:spTree>
+      <p:nvGrpSpPr>
+        <p:cNvPr id="1" name=""/>
+        <p:cNvGrpSpPr/>
+        <p:nvPr/>
+      </p:nvGrpSpPr>
+      <p:grpSpPr>
+        <a:xfrm>
+          <a:off x="0" y="0"/>
+          <a:ext cx="0" cy="0"/>
+          <a:chOff x="0" y="0"/>
+          <a:chExt cx="0" cy="0"/>
+        </a:xfrm>
+      </p:grpSpPr>
+      <p:sp>
+        <p:nvSpPr>
+          <p:cNvPr id="2" name="Slide Image Placeholder 1"/>
+          <p:cNvSpPr>
+            <a:spLocks noGrp="1" noRot="1" noChangeAspect="1"/>
+          </p:cNvSpPr>
+          <p:nvPr>
+            <p:ph type="sldImg"/>
+          </p:nvPr>
+        </p:nvSpPr>
+        <p:spPr/>
+      </p:sp>
+      <p:sp>
+        <p:nvSpPr>
+          <p:cNvPr id="3" name="Notes Placeholder 2"/>
+          <p:cNvSpPr>
+            <a:spLocks noGrp="1"/>
+          </p:cNvSpPr>
+          <p:nvPr>
+            <p:ph type="body" idx="1"/>
+          </p:nvPr>
+        </p:nvSpPr>
+        <p:spPr/>
+        <p:txBody>
+          <a:bodyPr/>
+          <a:lstStyle/>
+          <a:p>
+            <a:endParaRPr lang="en-US" dirty="0"/>
+          </a:p>
+        </p:txBody>
+      </p:sp>
+      <p:sp>
+        <p:nvSpPr>
+          <p:cNvPr id="4" name="Slide Number Placeholder 3"/>
+          <p:cNvSpPr>
+            <a:spLocks noGrp="1"/>
+          </p:cNvSpPr>
+          <p:nvPr>
+            <p:ph type="sldNum" sz="quarter" idx="5"/>
+          </p:nvPr>
+        </p:nvSpPr>
+        <p:spPr/>
+        <p:txBody>
+          <a:bodyPr/>
+          <a:lstStyle/>
+          <a:p>
+            <a:fld id="{ECBC060B-2A04-0C4D-A678-2D8906F1B1D8}" type="slidenum">
+              <a:rPr lang="en-US" smtClean="0"/>
+              <a:t>2</a:t>
+            </a:fld>
+            <a:endParaRPr lang="en-US"/>
+          </a:p>
+        </p:txBody>
+      </p:sp>
+    </p:spTree>
+    <p:extLst>
+      <p:ext uri="{BB962C8B-B14F-4D97-AF65-F5344CB8AC3E}">
+        <p14:creationId xmlns:p14="http://schemas.microsoft.com/office/powerpoint/2010/main" val="479120022"/>
+      </p:ext>
+    </p:extLst>
+  </p:cSld>
+  <p:clrMapOvr>
+    <a:masterClrMapping/>
+  </p:clrMapOvr>
+</p:notes>
+</file>
+
 <file path=ppt/slideLayouts/slideLayout1.xml><?xml version="1.0" encoding="utf-8"?>
 <p:sldLayout xmlns:a="http://schemas.openxmlformats.org/drawingml/2006/main" xmlns:r="http://schemas.openxmlformats.org/officeDocument/2006/relationships" xmlns:p="http://schemas.openxmlformats.org/presentationml/2006/main" type="title" preserve="1">
   <p:cSld name="Title Slide">
@@ -696,7 +781,7 @@
           <a:p>
             <a:fld id="{F0438D75-6BB9-074B-BA56-18BB868D5A9A}" type="datetimeFigureOut">
               <a:rPr lang="en-US" smtClean="0"/>
-              <a:t>12/28/23</a:t>
+              <a:t>1/10/24</a:t>
             </a:fld>
             <a:endParaRPr lang="en-US"/>
           </a:p>
@@ -894,7 +979,7 @@
           <a:p>
             <a:fld id="{F0438D75-6BB9-074B-BA56-18BB868D5A9A}" type="datetimeFigureOut">
               <a:rPr lang="en-US" smtClean="0"/>
-              <a:t>12/28/23</a:t>
+              <a:t>1/10/24</a:t>
             </a:fld>
             <a:endParaRPr lang="en-US"/>
           </a:p>
@@ -1102,7 +1187,7 @@
           <a:p>
             <a:fld id="{F0438D75-6BB9-074B-BA56-18BB868D5A9A}" type="datetimeFigureOut">
               <a:rPr lang="en-US" smtClean="0"/>
-              <a:t>12/28/23</a:t>
+              <a:t>1/10/24</a:t>
             </a:fld>
             <a:endParaRPr lang="en-US"/>
           </a:p>
@@ -1300,7 +1385,7 @@
           <a:p>
             <a:fld id="{F0438D75-6BB9-074B-BA56-18BB868D5A9A}" type="datetimeFigureOut">
               <a:rPr lang="en-US" smtClean="0"/>
-              <a:t>12/28/23</a:t>
+              <a:t>1/10/24</a:t>
             </a:fld>
             <a:endParaRPr lang="en-US"/>
           </a:p>
@@ -1575,7 +1660,7 @@
           <a:p>
             <a:fld id="{F0438D75-6BB9-074B-BA56-18BB868D5A9A}" type="datetimeFigureOut">
               <a:rPr lang="en-US" smtClean="0"/>
-              <a:t>12/28/23</a:t>
+              <a:t>1/10/24</a:t>
             </a:fld>
             <a:endParaRPr lang="en-US"/>
           </a:p>
@@ -1840,7 +1925,7 @@
           <a:p>
             <a:fld id="{F0438D75-6BB9-074B-BA56-18BB868D5A9A}" type="datetimeFigureOut">
               <a:rPr lang="en-US" smtClean="0"/>
-              <a:t>12/28/23</a:t>
+              <a:t>1/10/24</a:t>
             </a:fld>
             <a:endParaRPr lang="en-US"/>
           </a:p>
@@ -2252,7 +2337,7 @@
           <a:p>
             <a:fld id="{F0438D75-6BB9-074B-BA56-18BB868D5A9A}" type="datetimeFigureOut">
               <a:rPr lang="en-US" smtClean="0"/>
-              <a:t>12/28/23</a:t>
+              <a:t>1/10/24</a:t>
             </a:fld>
             <a:endParaRPr lang="en-US"/>
           </a:p>
@@ -2393,7 +2478,7 @@
           <a:p>
             <a:fld id="{F0438D75-6BB9-074B-BA56-18BB868D5A9A}" type="datetimeFigureOut">
               <a:rPr lang="en-US" smtClean="0"/>
-              <a:t>12/28/23</a:t>
+              <a:t>1/10/24</a:t>
             </a:fld>
             <a:endParaRPr lang="en-US"/>
           </a:p>
@@ -2506,7 +2591,7 @@
           <a:p>
             <a:fld id="{F0438D75-6BB9-074B-BA56-18BB868D5A9A}" type="datetimeFigureOut">
               <a:rPr lang="en-US" smtClean="0"/>
-              <a:t>12/28/23</a:t>
+              <a:t>1/10/24</a:t>
             </a:fld>
             <a:endParaRPr lang="en-US"/>
           </a:p>
@@ -2817,7 +2902,7 @@
           <a:p>
             <a:fld id="{F0438D75-6BB9-074B-BA56-18BB868D5A9A}" type="datetimeFigureOut">
               <a:rPr lang="en-US" smtClean="0"/>
-              <a:t>12/28/23</a:t>
+              <a:t>1/10/24</a:t>
             </a:fld>
             <a:endParaRPr lang="en-US"/>
           </a:p>
@@ -3105,7 +3190,7 @@
           <a:p>
             <a:fld id="{F0438D75-6BB9-074B-BA56-18BB868D5A9A}" type="datetimeFigureOut">
               <a:rPr lang="en-US" smtClean="0"/>
-              <a:t>12/28/23</a:t>
+              <a:t>1/10/24</a:t>
             </a:fld>
             <a:endParaRPr lang="en-US"/>
           </a:p>
@@ -3346,7 +3431,7 @@
           <a:p>
             <a:fld id="{F0438D75-6BB9-074B-BA56-18BB868D5A9A}" type="datetimeFigureOut">
               <a:rPr lang="en-US" smtClean="0"/>
-              <a:t>12/28/23</a:t>
+              <a:t>1/10/24</a:t>
             </a:fld>
             <a:endParaRPr lang="en-US"/>
           </a:p>
@@ -5113,8 +5198,8 @@
           </a:fontRef>
         </p:style>
       </p:cxnSp>
-      <mc:AlternateContent xmlns:mc="http://schemas.openxmlformats.org/markup-compatibility/2006">
-        <mc:Choice xmlns:a14="http://schemas.microsoft.com/office/drawing/2010/main" Requires="a14">
+      <mc:AlternateContent xmlns:mc="http://schemas.openxmlformats.org/markup-compatibility/2006" xmlns:a14="http://schemas.microsoft.com/office/drawing/2010/main">
+        <mc:Choice Requires="a14">
           <p:sp>
             <p:nvSpPr>
               <p:cNvPr id="197" name="TextBox 196">
@@ -5183,7 +5268,7 @@
             </p:txBody>
           </p:sp>
         </mc:Choice>
-        <mc:Fallback>
+        <mc:Fallback xmlns="">
           <p:sp>
             <p:nvSpPr>
               <p:cNvPr id="197" name="TextBox 196">
@@ -5458,8 +5543,8 @@
           </p:sp>
         </mc:Fallback>
       </mc:AlternateContent>
-      <mc:AlternateContent xmlns:mc="http://schemas.openxmlformats.org/markup-compatibility/2006">
-        <mc:Choice xmlns:a14="http://schemas.microsoft.com/office/drawing/2010/main" Requires="a14">
+      <mc:AlternateContent xmlns:mc="http://schemas.openxmlformats.org/markup-compatibility/2006" xmlns:a14="http://schemas.microsoft.com/office/drawing/2010/main">
+        <mc:Choice Requires="a14">
           <p:sp>
             <p:nvSpPr>
               <p:cNvPr id="200" name="TextBox 199">
@@ -5528,7 +5613,7 @@
             </p:txBody>
           </p:sp>
         </mc:Choice>
-        <mc:Fallback>
+        <mc:Fallback xmlns="">
           <p:sp>
             <p:nvSpPr>
               <p:cNvPr id="200" name="TextBox 199">
@@ -6322,6 +6407,1358 @@
 </file>
 
 <file path=ppt/slides/slide2.xml><?xml version="1.0" encoding="utf-8"?>
+<p:sld xmlns:a="http://schemas.openxmlformats.org/drawingml/2006/main" xmlns:r="http://schemas.openxmlformats.org/officeDocument/2006/relationships" xmlns:p="http://schemas.openxmlformats.org/presentationml/2006/main">
+  <p:cSld>
+    <p:spTree>
+      <p:nvGrpSpPr>
+        <p:cNvPr id="1" name=""/>
+        <p:cNvGrpSpPr/>
+        <p:nvPr/>
+      </p:nvGrpSpPr>
+      <p:grpSpPr>
+        <a:xfrm>
+          <a:off x="0" y="0"/>
+          <a:ext cx="0" cy="0"/>
+          <a:chOff x="0" y="0"/>
+          <a:chExt cx="0" cy="0"/>
+        </a:xfrm>
+      </p:grpSpPr>
+      <p:sp>
+        <p:nvSpPr>
+          <p:cNvPr id="52" name="Rectangle 51">
+            <a:extLst>
+              <a:ext uri="{FF2B5EF4-FFF2-40B4-BE49-F238E27FC236}">
+                <a16:creationId xmlns:a16="http://schemas.microsoft.com/office/drawing/2014/main" id="{D7D77805-B170-E443-9896-35058F8A48CF}"/>
+              </a:ext>
+            </a:extLst>
+          </p:cNvPr>
+          <p:cNvSpPr/>
+          <p:nvPr/>
+        </p:nvSpPr>
+        <p:spPr>
+          <a:xfrm>
+            <a:off x="341937" y="269325"/>
+            <a:ext cx="11461180" cy="6352192"/>
+          </a:xfrm>
+          <a:prstGeom prst="rect">
+            <a:avLst/>
+          </a:prstGeom>
+          <a:noFill/>
+        </p:spPr>
+        <p:style>
+          <a:lnRef idx="2">
+            <a:schemeClr val="accent1">
+              <a:shade val="50000"/>
+            </a:schemeClr>
+          </a:lnRef>
+          <a:fillRef idx="1">
+            <a:schemeClr val="accent1"/>
+          </a:fillRef>
+          <a:effectRef idx="0">
+            <a:schemeClr val="accent1"/>
+          </a:effectRef>
+          <a:fontRef idx="minor">
+            <a:schemeClr val="lt1"/>
+          </a:fontRef>
+        </p:style>
+        <p:txBody>
+          <a:bodyPr rtlCol="0" anchor="ctr"/>
+          <a:lstStyle/>
+          <a:p>
+            <a:pPr algn="ctr"/>
+            <a:endParaRPr lang="en-US" dirty="0">
+              <a:solidFill>
+                <a:schemeClr val="tx1"/>
+              </a:solidFill>
+            </a:endParaRPr>
+          </a:p>
+        </p:txBody>
+      </p:sp>
+      <p:sp>
+        <p:nvSpPr>
+          <p:cNvPr id="53" name="Rectangle 52">
+            <a:extLst>
+              <a:ext uri="{FF2B5EF4-FFF2-40B4-BE49-F238E27FC236}">
+                <a16:creationId xmlns:a16="http://schemas.microsoft.com/office/drawing/2014/main" id="{0B6B1A03-9399-B568-DB79-138AA42602A5}"/>
+              </a:ext>
+            </a:extLst>
+          </p:cNvPr>
+          <p:cNvSpPr/>
+          <p:nvPr/>
+        </p:nvSpPr>
+        <p:spPr>
+          <a:xfrm>
+            <a:off x="4683015" y="116924"/>
+            <a:ext cx="2405556" cy="655584"/>
+          </a:xfrm>
+          <a:prstGeom prst="rect">
+            <a:avLst/>
+          </a:prstGeom>
+          <a:noFill/>
+          <a:ln>
+            <a:noFill/>
+          </a:ln>
+        </p:spPr>
+        <p:style>
+          <a:lnRef idx="2">
+            <a:schemeClr val="accent1">
+              <a:shade val="50000"/>
+            </a:schemeClr>
+          </a:lnRef>
+          <a:fillRef idx="1">
+            <a:schemeClr val="accent1"/>
+          </a:fillRef>
+          <a:effectRef idx="0">
+            <a:schemeClr val="accent1"/>
+          </a:effectRef>
+          <a:fontRef idx="minor">
+            <a:schemeClr val="lt1"/>
+          </a:fontRef>
+        </p:style>
+        <p:txBody>
+          <a:bodyPr rtlCol="0" anchor="ctr"/>
+          <a:lstStyle/>
+          <a:p>
+            <a:pPr algn="ctr"/>
+            <a:r>
+              <a:rPr lang="en-US" b="1" dirty="0">
+                <a:solidFill>
+                  <a:schemeClr val="tx1"/>
+                </a:solidFill>
+              </a:rPr>
+              <a:t>Policy Evaluation</a:t>
+            </a:r>
+          </a:p>
+        </p:txBody>
+      </p:sp>
+      <p:sp>
+        <p:nvSpPr>
+          <p:cNvPr id="113" name="Rectangle 112">
+            <a:extLst>
+              <a:ext uri="{FF2B5EF4-FFF2-40B4-BE49-F238E27FC236}">
+                <a16:creationId xmlns:a16="http://schemas.microsoft.com/office/drawing/2014/main" id="{1883087D-0271-C825-D899-C5E86EE27363}"/>
+              </a:ext>
+            </a:extLst>
+          </p:cNvPr>
+          <p:cNvSpPr/>
+          <p:nvPr/>
+        </p:nvSpPr>
+        <p:spPr>
+          <a:xfrm>
+            <a:off x="10019801" y="667302"/>
+            <a:ext cx="1495756" cy="655584"/>
+          </a:xfrm>
+          <a:prstGeom prst="rect">
+            <a:avLst/>
+          </a:prstGeom>
+          <a:noFill/>
+          <a:ln>
+            <a:noFill/>
+          </a:ln>
+        </p:spPr>
+        <p:style>
+          <a:lnRef idx="2">
+            <a:schemeClr val="accent1">
+              <a:shade val="50000"/>
+            </a:schemeClr>
+          </a:lnRef>
+          <a:fillRef idx="1">
+            <a:schemeClr val="accent1"/>
+          </a:fillRef>
+          <a:effectRef idx="0">
+            <a:schemeClr val="accent1"/>
+          </a:effectRef>
+          <a:fontRef idx="minor">
+            <a:schemeClr val="lt1"/>
+          </a:fontRef>
+        </p:style>
+        <p:txBody>
+          <a:bodyPr rtlCol="0" anchor="ctr"/>
+          <a:lstStyle/>
+          <a:p>
+            <a:pPr algn="ctr"/>
+            <a:r>
+              <a:rPr lang="en-US" dirty="0">
+                <a:solidFill>
+                  <a:srgbClr val="FFC000"/>
+                </a:solidFill>
+              </a:rPr>
+              <a:t>Policies</a:t>
+            </a:r>
+          </a:p>
+        </p:txBody>
+      </p:sp>
+      <p:grpSp>
+        <p:nvGrpSpPr>
+          <p:cNvPr id="20" name="Group 19">
+            <a:extLst>
+              <a:ext uri="{FF2B5EF4-FFF2-40B4-BE49-F238E27FC236}">
+                <a16:creationId xmlns:a16="http://schemas.microsoft.com/office/drawing/2014/main" id="{A44DBE1F-AD5E-EDBE-7275-F04981B54EDB}"/>
+              </a:ext>
+            </a:extLst>
+          </p:cNvPr>
+          <p:cNvGrpSpPr/>
+          <p:nvPr/>
+        </p:nvGrpSpPr>
+        <p:grpSpPr>
+          <a:xfrm>
+            <a:off x="3342898" y="1966327"/>
+            <a:ext cx="4688012" cy="1672001"/>
+            <a:chOff x="3342898" y="1966327"/>
+            <a:chExt cx="4688012" cy="1672001"/>
+          </a:xfrm>
+        </p:grpSpPr>
+        <p:sp>
+          <p:nvSpPr>
+            <p:cNvPr id="2" name="Rounded Rectangle 1">
+              <a:extLst>
+                <a:ext uri="{FF2B5EF4-FFF2-40B4-BE49-F238E27FC236}">
+                  <a16:creationId xmlns:a16="http://schemas.microsoft.com/office/drawing/2014/main" id="{3E11D17A-0AA2-D330-2DB2-4A272ACE0608}"/>
+                </a:ext>
+              </a:extLst>
+            </p:cNvPr>
+            <p:cNvSpPr/>
+            <p:nvPr/>
+          </p:nvSpPr>
+          <p:spPr>
+            <a:xfrm>
+              <a:off x="4874606" y="2939709"/>
+              <a:ext cx="1751039" cy="647451"/>
+            </a:xfrm>
+            <a:prstGeom prst="roundRect">
+              <a:avLst/>
+            </a:prstGeom>
+            <a:noFill/>
+            <a:ln w="28575"/>
+          </p:spPr>
+          <p:style>
+            <a:lnRef idx="2">
+              <a:schemeClr val="accent1">
+                <a:shade val="15000"/>
+              </a:schemeClr>
+            </a:lnRef>
+            <a:fillRef idx="1">
+              <a:schemeClr val="accent1"/>
+            </a:fillRef>
+            <a:effectRef idx="0">
+              <a:schemeClr val="accent1"/>
+            </a:effectRef>
+            <a:fontRef idx="minor">
+              <a:schemeClr val="lt1"/>
+            </a:fontRef>
+          </p:style>
+          <p:txBody>
+            <a:bodyPr rtlCol="0" anchor="ctr"/>
+            <a:lstStyle/>
+            <a:p>
+              <a:pPr algn="ctr"/>
+              <a:r>
+                <a:rPr lang="en-US" b="1" dirty="0">
+                  <a:solidFill>
+                    <a:schemeClr val="tx1"/>
+                  </a:solidFill>
+                </a:rPr>
+                <a:t>Environment</a:t>
+              </a:r>
+            </a:p>
+          </p:txBody>
+        </p:sp>
+        <p:sp>
+          <p:nvSpPr>
+            <p:cNvPr id="49" name="Rounded Rectangle 48">
+              <a:extLst>
+                <a:ext uri="{FF2B5EF4-FFF2-40B4-BE49-F238E27FC236}">
+                  <a16:creationId xmlns:a16="http://schemas.microsoft.com/office/drawing/2014/main" id="{3B54D7D8-0DE5-2C65-0D24-591510A32DB1}"/>
+                </a:ext>
+              </a:extLst>
+            </p:cNvPr>
+            <p:cNvSpPr/>
+            <p:nvPr/>
+          </p:nvSpPr>
+          <p:spPr>
+            <a:xfrm>
+              <a:off x="4920957" y="1966327"/>
+              <a:ext cx="1530065" cy="503140"/>
+            </a:xfrm>
+            <a:prstGeom prst="roundRect">
+              <a:avLst/>
+            </a:prstGeom>
+            <a:noFill/>
+            <a:ln w="28575"/>
+          </p:spPr>
+          <p:style>
+            <a:lnRef idx="2">
+              <a:schemeClr val="accent1">
+                <a:shade val="15000"/>
+              </a:schemeClr>
+            </a:lnRef>
+            <a:fillRef idx="1">
+              <a:schemeClr val="accent1"/>
+            </a:fillRef>
+            <a:effectRef idx="0">
+              <a:schemeClr val="accent1"/>
+            </a:effectRef>
+            <a:fontRef idx="minor">
+              <a:schemeClr val="lt1"/>
+            </a:fontRef>
+          </p:style>
+          <p:txBody>
+            <a:bodyPr rtlCol="0" anchor="t" anchorCtr="0"/>
+            <a:lstStyle/>
+            <a:p>
+              <a:pPr algn="ctr"/>
+              <a:r>
+                <a:rPr lang="en-US" b="1" dirty="0">
+                  <a:solidFill>
+                    <a:schemeClr val="tx1"/>
+                  </a:solidFill>
+                </a:rPr>
+                <a:t>Agent</a:t>
+              </a:r>
+            </a:p>
+          </p:txBody>
+        </p:sp>
+        <p:cxnSp>
+          <p:nvCxnSpPr>
+            <p:cNvPr id="153" name="Straight Connector 152">
+              <a:extLst>
+                <a:ext uri="{FF2B5EF4-FFF2-40B4-BE49-F238E27FC236}">
+                  <a16:creationId xmlns:a16="http://schemas.microsoft.com/office/drawing/2014/main" id="{8C7E532F-DD61-26B9-CC10-F523162DFA12}"/>
+                </a:ext>
+              </a:extLst>
+            </p:cNvPr>
+            <p:cNvCxnSpPr>
+              <a:cxnSpLocks/>
+            </p:cNvCxnSpPr>
+            <p:nvPr/>
+          </p:nvCxnSpPr>
+          <p:spPr>
+            <a:xfrm flipH="1">
+              <a:off x="3671594" y="3370203"/>
+              <a:ext cx="1190968" cy="0"/>
+            </a:xfrm>
+            <a:prstGeom prst="line">
+              <a:avLst/>
+            </a:prstGeom>
+            <a:ln w="28575">
+              <a:solidFill>
+                <a:schemeClr val="tx1"/>
+              </a:solidFill>
+            </a:ln>
+          </p:spPr>
+          <p:style>
+            <a:lnRef idx="1">
+              <a:schemeClr val="accent1"/>
+            </a:lnRef>
+            <a:fillRef idx="0">
+              <a:schemeClr val="accent1"/>
+            </a:fillRef>
+            <a:effectRef idx="0">
+              <a:schemeClr val="accent1"/>
+            </a:effectRef>
+            <a:fontRef idx="minor">
+              <a:schemeClr val="tx1"/>
+            </a:fontRef>
+          </p:style>
+        </p:cxnSp>
+        <p:cxnSp>
+          <p:nvCxnSpPr>
+            <p:cNvPr id="154" name="Straight Connector 153">
+              <a:extLst>
+                <a:ext uri="{FF2B5EF4-FFF2-40B4-BE49-F238E27FC236}">
+                  <a16:creationId xmlns:a16="http://schemas.microsoft.com/office/drawing/2014/main" id="{9C6D9F1E-DEE8-6C72-7019-B4DF9ED07D7C}"/>
+                </a:ext>
+              </a:extLst>
+            </p:cNvPr>
+            <p:cNvCxnSpPr>
+              <a:cxnSpLocks/>
+            </p:cNvCxnSpPr>
+            <p:nvPr/>
+          </p:nvCxnSpPr>
+          <p:spPr>
+            <a:xfrm>
+              <a:off x="3671056" y="2113599"/>
+              <a:ext cx="0" cy="1267546"/>
+            </a:xfrm>
+            <a:prstGeom prst="line">
+              <a:avLst/>
+            </a:prstGeom>
+            <a:ln w="28575">
+              <a:solidFill>
+                <a:schemeClr val="tx1"/>
+              </a:solidFill>
+            </a:ln>
+          </p:spPr>
+          <p:style>
+            <a:lnRef idx="1">
+              <a:schemeClr val="accent1"/>
+            </a:lnRef>
+            <a:fillRef idx="0">
+              <a:schemeClr val="accent1"/>
+            </a:fillRef>
+            <a:effectRef idx="0">
+              <a:schemeClr val="accent1"/>
+            </a:effectRef>
+            <a:fontRef idx="minor">
+              <a:schemeClr val="tx1"/>
+            </a:fontRef>
+          </p:style>
+        </p:cxnSp>
+        <p:cxnSp>
+          <p:nvCxnSpPr>
+            <p:cNvPr id="157" name="Straight Connector 156">
+              <a:extLst>
+                <a:ext uri="{FF2B5EF4-FFF2-40B4-BE49-F238E27FC236}">
+                  <a16:creationId xmlns:a16="http://schemas.microsoft.com/office/drawing/2014/main" id="{63A608DF-49F7-81C3-46FA-1F7622C30E67}"/>
+                </a:ext>
+              </a:extLst>
+            </p:cNvPr>
+            <p:cNvCxnSpPr>
+              <a:cxnSpLocks/>
+            </p:cNvCxnSpPr>
+            <p:nvPr/>
+          </p:nvCxnSpPr>
+          <p:spPr>
+            <a:xfrm flipH="1">
+              <a:off x="3663127" y="2113599"/>
+              <a:ext cx="1257830" cy="0"/>
+            </a:xfrm>
+            <a:prstGeom prst="line">
+              <a:avLst/>
+            </a:prstGeom>
+            <a:ln w="28575">
+              <a:solidFill>
+                <a:schemeClr val="tx1"/>
+              </a:solidFill>
+              <a:headEnd type="triangle" w="med" len="med"/>
+              <a:tailEnd type="none" w="med" len="med"/>
+            </a:ln>
+          </p:spPr>
+          <p:style>
+            <a:lnRef idx="1">
+              <a:schemeClr val="accent1"/>
+            </a:lnRef>
+            <a:fillRef idx="0">
+              <a:schemeClr val="accent1"/>
+            </a:fillRef>
+            <a:effectRef idx="0">
+              <a:schemeClr val="accent1"/>
+            </a:effectRef>
+            <a:fontRef idx="minor">
+              <a:schemeClr val="tx1"/>
+            </a:fontRef>
+          </p:style>
+        </p:cxnSp>
+        <p:cxnSp>
+          <p:nvCxnSpPr>
+            <p:cNvPr id="161" name="Straight Connector 160">
+              <a:extLst>
+                <a:ext uri="{FF2B5EF4-FFF2-40B4-BE49-F238E27FC236}">
+                  <a16:creationId xmlns:a16="http://schemas.microsoft.com/office/drawing/2014/main" id="{3A7EF99D-E1FE-6E2D-523E-0C4ED06012BE}"/>
+                </a:ext>
+              </a:extLst>
+            </p:cNvPr>
+            <p:cNvCxnSpPr>
+              <a:cxnSpLocks/>
+              <a:endCxn id="2" idx="3"/>
+            </p:cNvCxnSpPr>
+            <p:nvPr/>
+          </p:nvCxnSpPr>
+          <p:spPr>
+            <a:xfrm flipH="1">
+              <a:off x="6625645" y="3263435"/>
+              <a:ext cx="1007405" cy="0"/>
+            </a:xfrm>
+            <a:prstGeom prst="line">
+              <a:avLst/>
+            </a:prstGeom>
+            <a:ln w="28575">
+              <a:solidFill>
+                <a:schemeClr val="tx1"/>
+              </a:solidFill>
+              <a:headEnd type="none" w="med" len="med"/>
+              <a:tailEnd type="triangle" w="med" len="med"/>
+            </a:ln>
+          </p:spPr>
+          <p:style>
+            <a:lnRef idx="1">
+              <a:schemeClr val="accent1"/>
+            </a:lnRef>
+            <a:fillRef idx="0">
+              <a:schemeClr val="accent1"/>
+            </a:fillRef>
+            <a:effectRef idx="0">
+              <a:schemeClr val="accent1"/>
+            </a:effectRef>
+            <a:fontRef idx="minor">
+              <a:schemeClr val="tx1"/>
+            </a:fontRef>
+          </p:style>
+        </p:cxnSp>
+        <p:cxnSp>
+          <p:nvCxnSpPr>
+            <p:cNvPr id="164" name="Straight Connector 163">
+              <a:extLst>
+                <a:ext uri="{FF2B5EF4-FFF2-40B4-BE49-F238E27FC236}">
+                  <a16:creationId xmlns:a16="http://schemas.microsoft.com/office/drawing/2014/main" id="{27E78BE7-D1F0-FC8D-5FC2-28B676E73A9A}"/>
+                </a:ext>
+              </a:extLst>
+            </p:cNvPr>
+            <p:cNvCxnSpPr>
+              <a:cxnSpLocks/>
+              <a:endCxn id="49" idx="3"/>
+            </p:cNvCxnSpPr>
+            <p:nvPr/>
+          </p:nvCxnSpPr>
+          <p:spPr>
+            <a:xfrm flipH="1">
+              <a:off x="6451022" y="2217897"/>
+              <a:ext cx="1172330" cy="0"/>
+            </a:xfrm>
+            <a:prstGeom prst="line">
+              <a:avLst/>
+            </a:prstGeom>
+            <a:ln w="28575">
+              <a:solidFill>
+                <a:schemeClr val="tx1"/>
+              </a:solidFill>
+            </a:ln>
+          </p:spPr>
+          <p:style>
+            <a:lnRef idx="1">
+              <a:schemeClr val="accent1"/>
+            </a:lnRef>
+            <a:fillRef idx="0">
+              <a:schemeClr val="accent1"/>
+            </a:fillRef>
+            <a:effectRef idx="0">
+              <a:schemeClr val="accent1"/>
+            </a:effectRef>
+            <a:fontRef idx="minor">
+              <a:schemeClr val="tx1"/>
+            </a:fontRef>
+          </p:style>
+        </p:cxnSp>
+        <p:cxnSp>
+          <p:nvCxnSpPr>
+            <p:cNvPr id="167" name="Straight Connector 166">
+              <a:extLst>
+                <a:ext uri="{FF2B5EF4-FFF2-40B4-BE49-F238E27FC236}">
+                  <a16:creationId xmlns:a16="http://schemas.microsoft.com/office/drawing/2014/main" id="{91852D0B-4ABD-34A9-4B4D-0ED1BBF1FD03}"/>
+                </a:ext>
+              </a:extLst>
+            </p:cNvPr>
+            <p:cNvCxnSpPr>
+              <a:cxnSpLocks/>
+            </p:cNvCxnSpPr>
+            <p:nvPr/>
+          </p:nvCxnSpPr>
+          <p:spPr>
+            <a:xfrm>
+              <a:off x="7633050" y="2217897"/>
+              <a:ext cx="0" cy="1045538"/>
+            </a:xfrm>
+            <a:prstGeom prst="line">
+              <a:avLst/>
+            </a:prstGeom>
+            <a:ln w="28575">
+              <a:solidFill>
+                <a:schemeClr val="tx1"/>
+              </a:solidFill>
+            </a:ln>
+          </p:spPr>
+          <p:style>
+            <a:lnRef idx="1">
+              <a:schemeClr val="accent1"/>
+            </a:lnRef>
+            <a:fillRef idx="0">
+              <a:schemeClr val="accent1"/>
+            </a:fillRef>
+            <a:effectRef idx="0">
+              <a:schemeClr val="accent1"/>
+            </a:effectRef>
+            <a:fontRef idx="minor">
+              <a:schemeClr val="tx1"/>
+            </a:fontRef>
+          </p:style>
+        </p:cxnSp>
+        <mc:AlternateContent xmlns:mc="http://schemas.openxmlformats.org/markup-compatibility/2006">
+          <mc:Choice xmlns:a14="http://schemas.microsoft.com/office/drawing/2010/main" Requires="a14">
+            <p:sp>
+              <p:nvSpPr>
+                <p:cNvPr id="197" name="TextBox 196">
+                  <a:extLst>
+                    <a:ext uri="{FF2B5EF4-FFF2-40B4-BE49-F238E27FC236}">
+                      <a16:creationId xmlns:a16="http://schemas.microsoft.com/office/drawing/2014/main" id="{E90CAC25-9E28-6DCE-0F4C-D5249E34F75E}"/>
+                    </a:ext>
+                  </a:extLst>
+                </p:cNvPr>
+                <p:cNvSpPr txBox="1"/>
+                <p:nvPr/>
+              </p:nvSpPr>
+              <p:spPr>
+                <a:xfrm>
+                  <a:off x="7769043" y="2572322"/>
+                  <a:ext cx="261867" cy="276999"/>
+                </a:xfrm>
+                <a:prstGeom prst="rect">
+                  <a:avLst/>
+                </a:prstGeom>
+                <a:noFill/>
+              </p:spPr>
+              <p:txBody>
+                <a:bodyPr wrap="none" lIns="0" tIns="0" rIns="0" bIns="0" rtlCol="0">
+                  <a:spAutoFit/>
+                </a:bodyPr>
+                <a:lstStyle/>
+                <a:p>
+                  <a:pPr/>
+                  <a14:m>
+                    <m:oMathPara xmlns:m="http://schemas.openxmlformats.org/officeDocument/2006/math">
+                      <m:oMathParaPr>
+                        <m:jc m:val="centerGroup"/>
+                      </m:oMathParaPr>
+                      <m:oMath xmlns:m="http://schemas.openxmlformats.org/officeDocument/2006/math">
+                        <m:sSub>
+                          <m:sSubPr>
+                            <m:ctrlPr>
+                              <a:rPr lang="en-US" b="0" i="1" smtClean="0">
+                                <a:latin typeface="Cambria Math" panose="02040503050406030204" pitchFamily="18" charset="0"/>
+                              </a:rPr>
+                            </m:ctrlPr>
+                          </m:sSubPr>
+                          <m:e>
+                            <m:r>
+                              <a:rPr lang="en-US" b="0" i="1" smtClean="0">
+                                <a:latin typeface="Cambria Math" panose="02040503050406030204" pitchFamily="18" charset="0"/>
+                              </a:rPr>
+                              <m:t>𝑥</m:t>
+                            </m:r>
+                          </m:e>
+                          <m:sub>
+                            <m:r>
+                              <a:rPr lang="en-US" b="0" i="1" smtClean="0">
+                                <a:latin typeface="Cambria Math" panose="02040503050406030204" pitchFamily="18" charset="0"/>
+                              </a:rPr>
+                              <m:t>𝑡</m:t>
+                            </m:r>
+                          </m:sub>
+                        </m:sSub>
+                      </m:oMath>
+                    </m:oMathPara>
+                  </a14:m>
+                  <a:endParaRPr lang="en-US" dirty="0"/>
+                </a:p>
+              </p:txBody>
+            </p:sp>
+          </mc:Choice>
+          <mc:Fallback>
+            <p:sp>
+              <p:nvSpPr>
+                <p:cNvPr id="197" name="TextBox 196">
+                  <a:extLst>
+                    <a:ext uri="{FF2B5EF4-FFF2-40B4-BE49-F238E27FC236}">
+                      <a16:creationId xmlns:a16="http://schemas.microsoft.com/office/drawing/2014/main" id="{E90CAC25-9E28-6DCE-0F4C-D5249E34F75E}"/>
+                    </a:ext>
+                  </a:extLst>
+                </p:cNvPr>
+                <p:cNvSpPr txBox="1">
+                  <a:spLocks noRot="1" noChangeAspect="1" noMove="1" noResize="1" noEditPoints="1" noAdjustHandles="1" noChangeArrowheads="1" noChangeShapeType="1" noTextEdit="1"/>
+                </p:cNvSpPr>
+                <p:nvPr/>
+              </p:nvSpPr>
+              <p:spPr>
+                <a:xfrm>
+                  <a:off x="7769043" y="2572322"/>
+                  <a:ext cx="261867" cy="276999"/>
+                </a:xfrm>
+                <a:prstGeom prst="rect">
+                  <a:avLst/>
+                </a:prstGeom>
+                <a:blipFill>
+                  <a:blip r:embed="rId3"/>
+                  <a:stretch>
+                    <a:fillRect l="-9091" r="-4545" b="-13043"/>
+                  </a:stretch>
+                </a:blipFill>
+              </p:spPr>
+              <p:txBody>
+                <a:bodyPr/>
+                <a:lstStyle/>
+                <a:p>
+                  <a:r>
+                    <a:rPr lang="en-US">
+                      <a:noFill/>
+                    </a:rPr>
+                    <a:t> </a:t>
+                  </a:r>
+                </a:p>
+              </p:txBody>
+            </p:sp>
+          </mc:Fallback>
+        </mc:AlternateContent>
+        <mc:AlternateContent xmlns:mc="http://schemas.openxmlformats.org/markup-compatibility/2006">
+          <mc:Choice xmlns:a14="http://schemas.microsoft.com/office/drawing/2010/main" Requires="a14">
+            <p:sp>
+              <p:nvSpPr>
+                <p:cNvPr id="198" name="TextBox 197">
+                  <a:extLst>
+                    <a:ext uri="{FF2B5EF4-FFF2-40B4-BE49-F238E27FC236}">
+                      <a16:creationId xmlns:a16="http://schemas.microsoft.com/office/drawing/2014/main" id="{A07F23AA-42CB-FF17-BFFE-0E6F78B107C7}"/>
+                    </a:ext>
+                  </a:extLst>
+                </p:cNvPr>
+                <p:cNvSpPr txBox="1"/>
+                <p:nvPr/>
+              </p:nvSpPr>
+              <p:spPr>
+                <a:xfrm>
+                  <a:off x="3342898" y="2426445"/>
+                  <a:ext cx="252377" cy="276999"/>
+                </a:xfrm>
+                <a:prstGeom prst="rect">
+                  <a:avLst/>
+                </a:prstGeom>
+                <a:noFill/>
+              </p:spPr>
+              <p:txBody>
+                <a:bodyPr wrap="none" lIns="0" tIns="0" rIns="0" bIns="0" rtlCol="0">
+                  <a:spAutoFit/>
+                </a:bodyPr>
+                <a:lstStyle/>
+                <a:p>
+                  <a:pPr/>
+                  <a14:m>
+                    <m:oMathPara xmlns:m="http://schemas.openxmlformats.org/officeDocument/2006/math">
+                      <m:oMathParaPr>
+                        <m:jc m:val="centerGroup"/>
+                      </m:oMathParaPr>
+                      <m:oMath xmlns:m="http://schemas.openxmlformats.org/officeDocument/2006/math">
+                        <m:sSub>
+                          <m:sSubPr>
+                            <m:ctrlPr>
+                              <a:rPr lang="en-US" b="0" i="1" smtClean="0">
+                                <a:latin typeface="Cambria Math" panose="02040503050406030204" pitchFamily="18" charset="0"/>
+                              </a:rPr>
+                            </m:ctrlPr>
+                          </m:sSubPr>
+                          <m:e>
+                            <m:r>
+                              <a:rPr lang="en-US" b="0" i="1" smtClean="0">
+                                <a:latin typeface="Cambria Math" panose="02040503050406030204" pitchFamily="18" charset="0"/>
+                              </a:rPr>
+                              <m:t>𝑆</m:t>
+                            </m:r>
+                          </m:e>
+                          <m:sub>
+                            <m:r>
+                              <a:rPr lang="en-US" b="0" i="1" smtClean="0">
+                                <a:latin typeface="Cambria Math" panose="02040503050406030204" pitchFamily="18" charset="0"/>
+                              </a:rPr>
+                              <m:t>𝑡</m:t>
+                            </m:r>
+                          </m:sub>
+                        </m:sSub>
+                      </m:oMath>
+                    </m:oMathPara>
+                  </a14:m>
+                  <a:endParaRPr lang="en-US" dirty="0"/>
+                </a:p>
+              </p:txBody>
+            </p:sp>
+          </mc:Choice>
+          <mc:Fallback>
+            <p:sp>
+              <p:nvSpPr>
+                <p:cNvPr id="198" name="TextBox 197">
+                  <a:extLst>
+                    <a:ext uri="{FF2B5EF4-FFF2-40B4-BE49-F238E27FC236}">
+                      <a16:creationId xmlns:a16="http://schemas.microsoft.com/office/drawing/2014/main" id="{A07F23AA-42CB-FF17-BFFE-0E6F78B107C7}"/>
+                    </a:ext>
+                  </a:extLst>
+                </p:cNvPr>
+                <p:cNvSpPr txBox="1">
+                  <a:spLocks noRot="1" noChangeAspect="1" noMove="1" noResize="1" noEditPoints="1" noAdjustHandles="1" noChangeArrowheads="1" noChangeShapeType="1" noTextEdit="1"/>
+                </p:cNvSpPr>
+                <p:nvPr/>
+              </p:nvSpPr>
+              <p:spPr>
+                <a:xfrm>
+                  <a:off x="3342898" y="2426445"/>
+                  <a:ext cx="252377" cy="276999"/>
+                </a:xfrm>
+                <a:prstGeom prst="rect">
+                  <a:avLst/>
+                </a:prstGeom>
+                <a:blipFill>
+                  <a:blip r:embed="rId4"/>
+                  <a:stretch>
+                    <a:fillRect l="-19048" r="-4762" b="-18182"/>
+                  </a:stretch>
+                </a:blipFill>
+              </p:spPr>
+              <p:txBody>
+                <a:bodyPr/>
+                <a:lstStyle/>
+                <a:p>
+                  <a:r>
+                    <a:rPr lang="en-US">
+                      <a:noFill/>
+                    </a:rPr>
+                    <a:t> </a:t>
+                  </a:r>
+                </a:p>
+              </p:txBody>
+            </p:sp>
+          </mc:Fallback>
+        </mc:AlternateContent>
+        <p:cxnSp>
+          <p:nvCxnSpPr>
+            <p:cNvPr id="204" name="Straight Connector 203">
+              <a:extLst>
+                <a:ext uri="{FF2B5EF4-FFF2-40B4-BE49-F238E27FC236}">
+                  <a16:creationId xmlns:a16="http://schemas.microsoft.com/office/drawing/2014/main" id="{11D8F9AA-666E-1591-7496-EA01614132FD}"/>
+                </a:ext>
+              </a:extLst>
+            </p:cNvPr>
+            <p:cNvCxnSpPr>
+              <a:cxnSpLocks/>
+            </p:cNvCxnSpPr>
+            <p:nvPr/>
+          </p:nvCxnSpPr>
+          <p:spPr>
+            <a:xfrm flipH="1">
+              <a:off x="3954095" y="3146012"/>
+              <a:ext cx="920511" cy="8213"/>
+            </a:xfrm>
+            <a:prstGeom prst="line">
+              <a:avLst/>
+            </a:prstGeom>
+            <a:ln w="19050">
+              <a:solidFill>
+                <a:schemeClr val="tx1"/>
+              </a:solidFill>
+            </a:ln>
+          </p:spPr>
+          <p:style>
+            <a:lnRef idx="1">
+              <a:schemeClr val="accent1"/>
+            </a:lnRef>
+            <a:fillRef idx="0">
+              <a:schemeClr val="accent1"/>
+            </a:fillRef>
+            <a:effectRef idx="0">
+              <a:schemeClr val="accent1"/>
+            </a:effectRef>
+            <a:fontRef idx="minor">
+              <a:schemeClr val="tx1"/>
+            </a:fontRef>
+          </p:style>
+        </p:cxnSp>
+        <p:cxnSp>
+          <p:nvCxnSpPr>
+            <p:cNvPr id="213" name="Straight Connector 212">
+              <a:extLst>
+                <a:ext uri="{FF2B5EF4-FFF2-40B4-BE49-F238E27FC236}">
+                  <a16:creationId xmlns:a16="http://schemas.microsoft.com/office/drawing/2014/main" id="{E18702C9-77B5-FF72-424A-DE46F638C321}"/>
+                </a:ext>
+              </a:extLst>
+            </p:cNvPr>
+            <p:cNvCxnSpPr>
+              <a:cxnSpLocks/>
+            </p:cNvCxnSpPr>
+            <p:nvPr/>
+          </p:nvCxnSpPr>
+          <p:spPr>
+            <a:xfrm>
+              <a:off x="3954095" y="2326899"/>
+              <a:ext cx="0" cy="825169"/>
+            </a:xfrm>
+            <a:prstGeom prst="line">
+              <a:avLst/>
+            </a:prstGeom>
+            <a:ln w="19050">
+              <a:solidFill>
+                <a:schemeClr val="tx1"/>
+              </a:solidFill>
+            </a:ln>
+          </p:spPr>
+          <p:style>
+            <a:lnRef idx="1">
+              <a:schemeClr val="accent1"/>
+            </a:lnRef>
+            <a:fillRef idx="0">
+              <a:schemeClr val="accent1"/>
+            </a:fillRef>
+            <a:effectRef idx="0">
+              <a:schemeClr val="accent1"/>
+            </a:effectRef>
+            <a:fontRef idx="minor">
+              <a:schemeClr val="tx1"/>
+            </a:fontRef>
+          </p:style>
+        </p:cxnSp>
+        <p:cxnSp>
+          <p:nvCxnSpPr>
+            <p:cNvPr id="216" name="Straight Connector 215">
+              <a:extLst>
+                <a:ext uri="{FF2B5EF4-FFF2-40B4-BE49-F238E27FC236}">
+                  <a16:creationId xmlns:a16="http://schemas.microsoft.com/office/drawing/2014/main" id="{66263BAC-5DE0-8D39-891B-377C9BFB0C49}"/>
+                </a:ext>
+              </a:extLst>
+            </p:cNvPr>
+            <p:cNvCxnSpPr>
+              <a:cxnSpLocks/>
+            </p:cNvCxnSpPr>
+            <p:nvPr/>
+          </p:nvCxnSpPr>
+          <p:spPr>
+            <a:xfrm flipH="1">
+              <a:off x="3954095" y="2326899"/>
+              <a:ext cx="966862" cy="0"/>
+            </a:xfrm>
+            <a:prstGeom prst="line">
+              <a:avLst/>
+            </a:prstGeom>
+            <a:ln w="19050">
+              <a:solidFill>
+                <a:schemeClr val="tx1"/>
+              </a:solidFill>
+              <a:headEnd type="triangle" w="med" len="med"/>
+              <a:tailEnd type="none" w="med" len="med"/>
+            </a:ln>
+          </p:spPr>
+          <p:style>
+            <a:lnRef idx="1">
+              <a:schemeClr val="accent1"/>
+            </a:lnRef>
+            <a:fillRef idx="0">
+              <a:schemeClr val="accent1"/>
+            </a:fillRef>
+            <a:effectRef idx="0">
+              <a:schemeClr val="accent1"/>
+            </a:effectRef>
+            <a:fontRef idx="minor">
+              <a:schemeClr val="tx1"/>
+            </a:fontRef>
+          </p:style>
+        </p:cxnSp>
+        <p:cxnSp>
+          <p:nvCxnSpPr>
+            <p:cNvPr id="220" name="Straight Connector 219">
+              <a:extLst>
+                <a:ext uri="{FF2B5EF4-FFF2-40B4-BE49-F238E27FC236}">
+                  <a16:creationId xmlns:a16="http://schemas.microsoft.com/office/drawing/2014/main" id="{4C269B3E-7C18-EE50-E269-98A1DE73508D}"/>
+                </a:ext>
+              </a:extLst>
+            </p:cNvPr>
+            <p:cNvCxnSpPr>
+              <a:cxnSpLocks/>
+            </p:cNvCxnSpPr>
+            <p:nvPr/>
+          </p:nvCxnSpPr>
+          <p:spPr>
+            <a:xfrm>
+              <a:off x="4318632" y="2969655"/>
+              <a:ext cx="0" cy="587557"/>
+            </a:xfrm>
+            <a:prstGeom prst="line">
+              <a:avLst/>
+            </a:prstGeom>
+            <a:ln w="12700">
+              <a:solidFill>
+                <a:schemeClr val="tx1"/>
+              </a:solidFill>
+              <a:prstDash val="dash"/>
+            </a:ln>
+          </p:spPr>
+          <p:style>
+            <a:lnRef idx="1">
+              <a:schemeClr val="accent1"/>
+            </a:lnRef>
+            <a:fillRef idx="0">
+              <a:schemeClr val="accent1"/>
+            </a:fillRef>
+            <a:effectRef idx="0">
+              <a:schemeClr val="accent1"/>
+            </a:effectRef>
+            <a:fontRef idx="minor">
+              <a:schemeClr val="tx1"/>
+            </a:fontRef>
+          </p:style>
+        </p:cxnSp>
+        <mc:AlternateContent xmlns:mc="http://schemas.openxmlformats.org/markup-compatibility/2006">
+          <mc:Choice xmlns:a14="http://schemas.microsoft.com/office/drawing/2010/main" Requires="a14">
+            <p:sp>
+              <p:nvSpPr>
+                <p:cNvPr id="223" name="TextBox 222">
+                  <a:extLst>
+                    <a:ext uri="{FF2B5EF4-FFF2-40B4-BE49-F238E27FC236}">
+                      <a16:creationId xmlns:a16="http://schemas.microsoft.com/office/drawing/2014/main" id="{584BAD20-3A15-7792-141C-3E873300DE11}"/>
+                    </a:ext>
+                  </a:extLst>
+                </p:cNvPr>
+                <p:cNvSpPr txBox="1"/>
+                <p:nvPr/>
+              </p:nvSpPr>
+              <p:spPr>
+                <a:xfrm>
+                  <a:off x="3954095" y="2433822"/>
+                  <a:ext cx="284180" cy="276999"/>
+                </a:xfrm>
+                <a:prstGeom prst="rect">
+                  <a:avLst/>
+                </a:prstGeom>
+                <a:noFill/>
+              </p:spPr>
+              <p:txBody>
+                <a:bodyPr wrap="none" lIns="0" tIns="0" rIns="0" bIns="0" rtlCol="0">
+                  <a:spAutoFit/>
+                </a:bodyPr>
+                <a:lstStyle/>
+                <a:p>
+                  <a:pPr/>
+                  <a14:m>
+                    <m:oMathPara xmlns:m="http://schemas.openxmlformats.org/officeDocument/2006/math">
+                      <m:oMathParaPr>
+                        <m:jc m:val="centerGroup"/>
+                      </m:oMathParaPr>
+                      <m:oMath xmlns:m="http://schemas.openxmlformats.org/officeDocument/2006/math">
+                        <m:sSub>
+                          <m:sSubPr>
+                            <m:ctrlPr>
+                              <a:rPr lang="en-US" b="0" i="1" smtClean="0">
+                                <a:latin typeface="Cambria Math" panose="02040503050406030204" pitchFamily="18" charset="0"/>
+                              </a:rPr>
+                            </m:ctrlPr>
+                          </m:sSubPr>
+                          <m:e>
+                            <m:r>
+                              <a:rPr lang="en-US" b="0" i="1" smtClean="0">
+                                <a:latin typeface="Cambria Math" panose="02040503050406030204" pitchFamily="18" charset="0"/>
+                              </a:rPr>
+                              <m:t>𝑅</m:t>
+                            </m:r>
+                          </m:e>
+                          <m:sub>
+                            <m:r>
+                              <a:rPr lang="en-US" b="0" i="1" smtClean="0">
+                                <a:latin typeface="Cambria Math" panose="02040503050406030204" pitchFamily="18" charset="0"/>
+                              </a:rPr>
+                              <m:t>𝑡</m:t>
+                            </m:r>
+                          </m:sub>
+                        </m:sSub>
+                      </m:oMath>
+                    </m:oMathPara>
+                  </a14:m>
+                  <a:endParaRPr lang="en-US" dirty="0"/>
+                </a:p>
+              </p:txBody>
+            </p:sp>
+          </mc:Choice>
+          <mc:Fallback>
+            <p:sp>
+              <p:nvSpPr>
+                <p:cNvPr id="223" name="TextBox 222">
+                  <a:extLst>
+                    <a:ext uri="{FF2B5EF4-FFF2-40B4-BE49-F238E27FC236}">
+                      <a16:creationId xmlns:a16="http://schemas.microsoft.com/office/drawing/2014/main" id="{584BAD20-3A15-7792-141C-3E873300DE11}"/>
+                    </a:ext>
+                  </a:extLst>
+                </p:cNvPr>
+                <p:cNvSpPr txBox="1">
+                  <a:spLocks noRot="1" noChangeAspect="1" noMove="1" noResize="1" noEditPoints="1" noAdjustHandles="1" noChangeArrowheads="1" noChangeShapeType="1" noTextEdit="1"/>
+                </p:cNvSpPr>
+                <p:nvPr/>
+              </p:nvSpPr>
+              <p:spPr>
+                <a:xfrm>
+                  <a:off x="3954095" y="2433822"/>
+                  <a:ext cx="284180" cy="276999"/>
+                </a:xfrm>
+                <a:prstGeom prst="rect">
+                  <a:avLst/>
+                </a:prstGeom>
+                <a:blipFill>
+                  <a:blip r:embed="rId5"/>
+                  <a:stretch>
+                    <a:fillRect l="-17391" r="-4348" b="-13043"/>
+                  </a:stretch>
+                </a:blipFill>
+              </p:spPr>
+              <p:txBody>
+                <a:bodyPr/>
+                <a:lstStyle/>
+                <a:p>
+                  <a:r>
+                    <a:rPr lang="en-US">
+                      <a:noFill/>
+                    </a:rPr>
+                    <a:t> </a:t>
+                  </a:r>
+                </a:p>
+              </p:txBody>
+            </p:sp>
+          </mc:Fallback>
+        </mc:AlternateContent>
+        <mc:AlternateContent xmlns:mc="http://schemas.openxmlformats.org/markup-compatibility/2006">
+          <mc:Choice xmlns:a14="http://schemas.microsoft.com/office/drawing/2010/main" Requires="a14">
+            <p:sp>
+              <p:nvSpPr>
+                <p:cNvPr id="224" name="TextBox 223">
+                  <a:extLst>
+                    <a:ext uri="{FF2B5EF4-FFF2-40B4-BE49-F238E27FC236}">
+                      <a16:creationId xmlns:a16="http://schemas.microsoft.com/office/drawing/2014/main" id="{B5A5C830-EFDD-BCA9-7DF7-360050A96C76}"/>
+                    </a:ext>
+                  </a:extLst>
+                </p:cNvPr>
+                <p:cNvSpPr txBox="1"/>
+                <p:nvPr/>
+              </p:nvSpPr>
+              <p:spPr>
+                <a:xfrm>
+                  <a:off x="4361755" y="3361329"/>
+                  <a:ext cx="471989" cy="276999"/>
+                </a:xfrm>
+                <a:prstGeom prst="rect">
+                  <a:avLst/>
+                </a:prstGeom>
+                <a:noFill/>
+              </p:spPr>
+              <p:txBody>
+                <a:bodyPr wrap="none" lIns="0" tIns="0" rIns="0" bIns="0" rtlCol="0">
+                  <a:spAutoFit/>
+                </a:bodyPr>
+                <a:lstStyle/>
+                <a:p>
+                  <a:pPr/>
+                  <a14:m>
+                    <m:oMathPara xmlns:m="http://schemas.openxmlformats.org/officeDocument/2006/math">
+                      <m:oMathParaPr>
+                        <m:jc m:val="centerGroup"/>
+                      </m:oMathParaPr>
+                      <m:oMath xmlns:m="http://schemas.openxmlformats.org/officeDocument/2006/math">
+                        <m:sSub>
+                          <m:sSubPr>
+                            <m:ctrlPr>
+                              <a:rPr lang="en-US" b="0" i="1" smtClean="0">
+                                <a:latin typeface="Cambria Math" panose="02040503050406030204" pitchFamily="18" charset="0"/>
+                              </a:rPr>
+                            </m:ctrlPr>
+                          </m:sSubPr>
+                          <m:e>
+                            <m:r>
+                              <a:rPr lang="en-US" b="0" i="1" smtClean="0">
+                                <a:latin typeface="Cambria Math" panose="02040503050406030204" pitchFamily="18" charset="0"/>
+                              </a:rPr>
+                              <m:t>𝑆</m:t>
+                            </m:r>
+                          </m:e>
+                          <m:sub>
+                            <m:r>
+                              <a:rPr lang="en-US" b="0" i="1" smtClean="0">
+                                <a:latin typeface="Cambria Math" panose="02040503050406030204" pitchFamily="18" charset="0"/>
+                              </a:rPr>
+                              <m:t>𝑡</m:t>
+                            </m:r>
+                            <m:r>
+                              <a:rPr lang="en-US" b="0" i="1" smtClean="0">
+                                <a:latin typeface="Cambria Math" panose="02040503050406030204" pitchFamily="18" charset="0"/>
+                              </a:rPr>
+                              <m:t>+1</m:t>
+                            </m:r>
+                          </m:sub>
+                        </m:sSub>
+                      </m:oMath>
+                    </m:oMathPara>
+                  </a14:m>
+                  <a:endParaRPr lang="en-US" dirty="0"/>
+                </a:p>
+              </p:txBody>
+            </p:sp>
+          </mc:Choice>
+          <mc:Fallback>
+            <p:sp>
+              <p:nvSpPr>
+                <p:cNvPr id="224" name="TextBox 223">
+                  <a:extLst>
+                    <a:ext uri="{FF2B5EF4-FFF2-40B4-BE49-F238E27FC236}">
+                      <a16:creationId xmlns:a16="http://schemas.microsoft.com/office/drawing/2014/main" id="{B5A5C830-EFDD-BCA9-7DF7-360050A96C76}"/>
+                    </a:ext>
+                  </a:extLst>
+                </p:cNvPr>
+                <p:cNvSpPr txBox="1">
+                  <a:spLocks noRot="1" noChangeAspect="1" noMove="1" noResize="1" noEditPoints="1" noAdjustHandles="1" noChangeArrowheads="1" noChangeShapeType="1" noTextEdit="1"/>
+                </p:cNvSpPr>
+                <p:nvPr/>
+              </p:nvSpPr>
+              <p:spPr>
+                <a:xfrm>
+                  <a:off x="4361755" y="3361329"/>
+                  <a:ext cx="471989" cy="276999"/>
+                </a:xfrm>
+                <a:prstGeom prst="rect">
+                  <a:avLst/>
+                </a:prstGeom>
+                <a:blipFill>
+                  <a:blip r:embed="rId6"/>
+                  <a:stretch>
+                    <a:fillRect l="-10526" r="-2632" b="-13043"/>
+                  </a:stretch>
+                </a:blipFill>
+              </p:spPr>
+              <p:txBody>
+                <a:bodyPr/>
+                <a:lstStyle/>
+                <a:p>
+                  <a:r>
+                    <a:rPr lang="en-US">
+                      <a:noFill/>
+                    </a:rPr>
+                    <a:t> </a:t>
+                  </a:r>
+                </a:p>
+              </p:txBody>
+            </p:sp>
+          </mc:Fallback>
+        </mc:AlternateContent>
+        <mc:AlternateContent xmlns:mc="http://schemas.openxmlformats.org/markup-compatibility/2006">
+          <mc:Choice xmlns:a14="http://schemas.microsoft.com/office/drawing/2010/main" Requires="a14">
+            <p:sp>
+              <p:nvSpPr>
+                <p:cNvPr id="225" name="TextBox 224">
+                  <a:extLst>
+                    <a:ext uri="{FF2B5EF4-FFF2-40B4-BE49-F238E27FC236}">
+                      <a16:creationId xmlns:a16="http://schemas.microsoft.com/office/drawing/2014/main" id="{BE42D6BB-8A42-4FD3-FB1C-D9C5CC37F3F4}"/>
+                    </a:ext>
+                  </a:extLst>
+                </p:cNvPr>
+                <p:cNvSpPr txBox="1"/>
+                <p:nvPr/>
+              </p:nvSpPr>
+              <p:spPr>
+                <a:xfrm>
+                  <a:off x="4342166" y="2849321"/>
+                  <a:ext cx="503792" cy="276999"/>
+                </a:xfrm>
+                <a:prstGeom prst="rect">
+                  <a:avLst/>
+                </a:prstGeom>
+                <a:noFill/>
+              </p:spPr>
+              <p:txBody>
+                <a:bodyPr wrap="none" lIns="0" tIns="0" rIns="0" bIns="0" rtlCol="0">
+                  <a:spAutoFit/>
+                </a:bodyPr>
+                <a:lstStyle/>
+                <a:p>
+                  <a:pPr/>
+                  <a14:m>
+                    <m:oMathPara xmlns:m="http://schemas.openxmlformats.org/officeDocument/2006/math">
+                      <m:oMathParaPr>
+                        <m:jc m:val="centerGroup"/>
+                      </m:oMathParaPr>
+                      <m:oMath xmlns:m="http://schemas.openxmlformats.org/officeDocument/2006/math">
+                        <m:sSub>
+                          <m:sSubPr>
+                            <m:ctrlPr>
+                              <a:rPr lang="en-US" b="0" i="1" smtClean="0">
+                                <a:latin typeface="Cambria Math" panose="02040503050406030204" pitchFamily="18" charset="0"/>
+                              </a:rPr>
+                            </m:ctrlPr>
+                          </m:sSubPr>
+                          <m:e>
+                            <m:r>
+                              <a:rPr lang="en-US" b="0" i="1" smtClean="0">
+                                <a:latin typeface="Cambria Math" panose="02040503050406030204" pitchFamily="18" charset="0"/>
+                              </a:rPr>
+                              <m:t>𝑅</m:t>
+                            </m:r>
+                          </m:e>
+                          <m:sub>
+                            <m:r>
+                              <a:rPr lang="en-US" b="0" i="1" smtClean="0">
+                                <a:latin typeface="Cambria Math" panose="02040503050406030204" pitchFamily="18" charset="0"/>
+                              </a:rPr>
+                              <m:t>𝑡</m:t>
+                            </m:r>
+                            <m:r>
+                              <a:rPr lang="en-US" b="0" i="1" smtClean="0">
+                                <a:latin typeface="Cambria Math" panose="02040503050406030204" pitchFamily="18" charset="0"/>
+                              </a:rPr>
+                              <m:t>+1</m:t>
+                            </m:r>
+                          </m:sub>
+                        </m:sSub>
+                      </m:oMath>
+                    </m:oMathPara>
+                  </a14:m>
+                  <a:endParaRPr lang="en-US" dirty="0"/>
+                </a:p>
+              </p:txBody>
+            </p:sp>
+          </mc:Choice>
+          <mc:Fallback>
+            <p:sp>
+              <p:nvSpPr>
+                <p:cNvPr id="225" name="TextBox 224">
+                  <a:extLst>
+                    <a:ext uri="{FF2B5EF4-FFF2-40B4-BE49-F238E27FC236}">
+                      <a16:creationId xmlns:a16="http://schemas.microsoft.com/office/drawing/2014/main" id="{BE42D6BB-8A42-4FD3-FB1C-D9C5CC37F3F4}"/>
+                    </a:ext>
+                  </a:extLst>
+                </p:cNvPr>
+                <p:cNvSpPr txBox="1">
+                  <a:spLocks noRot="1" noChangeAspect="1" noMove="1" noResize="1" noEditPoints="1" noAdjustHandles="1" noChangeArrowheads="1" noChangeShapeType="1" noTextEdit="1"/>
+                </p:cNvSpPr>
+                <p:nvPr/>
+              </p:nvSpPr>
+              <p:spPr>
+                <a:xfrm>
+                  <a:off x="4342166" y="2849321"/>
+                  <a:ext cx="503792" cy="276999"/>
+                </a:xfrm>
+                <a:prstGeom prst="rect">
+                  <a:avLst/>
+                </a:prstGeom>
+                <a:blipFill>
+                  <a:blip r:embed="rId7"/>
+                  <a:stretch>
+                    <a:fillRect l="-9756" r="-2439" b="-13043"/>
+                  </a:stretch>
+                </a:blipFill>
+              </p:spPr>
+              <p:txBody>
+                <a:bodyPr/>
+                <a:lstStyle/>
+                <a:p>
+                  <a:r>
+                    <a:rPr lang="en-US">
+                      <a:noFill/>
+                    </a:rPr>
+                    <a:t> </a:t>
+                  </a:r>
+                </a:p>
+              </p:txBody>
+            </p:sp>
+          </mc:Fallback>
+        </mc:AlternateContent>
+      </p:grpSp>
+    </p:spTree>
+    <p:extLst>
+      <p:ext uri="{BB962C8B-B14F-4D97-AF65-F5344CB8AC3E}">
+        <p14:creationId xmlns:p14="http://schemas.microsoft.com/office/powerpoint/2010/main" val="113819493"/>
+      </p:ext>
+    </p:extLst>
+  </p:cSld>
+  <p:clrMapOvr>
+    <a:masterClrMapping/>
+  </p:clrMapOvr>
+</p:sld>
+</file>
+
+<file path=ppt/slides/slide3.xml><?xml version="1.0" encoding="utf-8"?>
 <p:sld xmlns:a="http://schemas.openxmlformats.org/drawingml/2006/main" xmlns:r="http://schemas.openxmlformats.org/officeDocument/2006/relationships" xmlns:p="http://schemas.openxmlformats.org/presentationml/2006/main">
   <p:cSld>
     <p:spTree>

</xml_diff>